<commit_message>
Fix #6 & anonymize output
</commit_message>
<xml_diff>
--- a/content/08-text_as_data/slides/graphs/graph_template.pptx
+++ b/content/08-text_as_data/slides/graphs/graph_template.pptx
@@ -272,7 +272,7 @@
           <a:p>
             <a:fld id="{49B5A622-7BB8-4C10-9D44-AD00F8B365F2}" type="datetimeFigureOut">
               <a:rPr lang="de-DE" smtClean="0"/>
-              <a:t>13.12.2022</a:t>
+              <a:t>02.05.2023</a:t>
             </a:fld>
             <a:endParaRPr lang="de-DE"/>
           </a:p>
@@ -472,7 +472,7 @@
           <a:p>
             <a:fld id="{49B5A622-7BB8-4C10-9D44-AD00F8B365F2}" type="datetimeFigureOut">
               <a:rPr lang="de-DE" smtClean="0"/>
-              <a:t>13.12.2022</a:t>
+              <a:t>02.05.2023</a:t>
             </a:fld>
             <a:endParaRPr lang="de-DE"/>
           </a:p>
@@ -682,7 +682,7 @@
           <a:p>
             <a:fld id="{49B5A622-7BB8-4C10-9D44-AD00F8B365F2}" type="datetimeFigureOut">
               <a:rPr lang="de-DE" smtClean="0"/>
-              <a:t>13.12.2022</a:t>
+              <a:t>02.05.2023</a:t>
             </a:fld>
             <a:endParaRPr lang="de-DE"/>
           </a:p>
@@ -882,7 +882,7 @@
           <a:p>
             <a:fld id="{49B5A622-7BB8-4C10-9D44-AD00F8B365F2}" type="datetimeFigureOut">
               <a:rPr lang="de-DE" smtClean="0"/>
-              <a:t>13.12.2022</a:t>
+              <a:t>02.05.2023</a:t>
             </a:fld>
             <a:endParaRPr lang="de-DE"/>
           </a:p>
@@ -1158,7 +1158,7 @@
           <a:p>
             <a:fld id="{49B5A622-7BB8-4C10-9D44-AD00F8B365F2}" type="datetimeFigureOut">
               <a:rPr lang="de-DE" smtClean="0"/>
-              <a:t>13.12.2022</a:t>
+              <a:t>02.05.2023</a:t>
             </a:fld>
             <a:endParaRPr lang="de-DE"/>
           </a:p>
@@ -1426,7 +1426,7 @@
           <a:p>
             <a:fld id="{49B5A622-7BB8-4C10-9D44-AD00F8B365F2}" type="datetimeFigureOut">
               <a:rPr lang="de-DE" smtClean="0"/>
-              <a:t>13.12.2022</a:t>
+              <a:t>02.05.2023</a:t>
             </a:fld>
             <a:endParaRPr lang="de-DE"/>
           </a:p>
@@ -1841,7 +1841,7 @@
           <a:p>
             <a:fld id="{49B5A622-7BB8-4C10-9D44-AD00F8B365F2}" type="datetimeFigureOut">
               <a:rPr lang="de-DE" smtClean="0"/>
-              <a:t>13.12.2022</a:t>
+              <a:t>02.05.2023</a:t>
             </a:fld>
             <a:endParaRPr lang="de-DE"/>
           </a:p>
@@ -1983,7 +1983,7 @@
           <a:p>
             <a:fld id="{49B5A622-7BB8-4C10-9D44-AD00F8B365F2}" type="datetimeFigureOut">
               <a:rPr lang="de-DE" smtClean="0"/>
-              <a:t>13.12.2022</a:t>
+              <a:t>02.05.2023</a:t>
             </a:fld>
             <a:endParaRPr lang="de-DE"/>
           </a:p>
@@ -2096,7 +2096,7 @@
           <a:p>
             <a:fld id="{49B5A622-7BB8-4C10-9D44-AD00F8B365F2}" type="datetimeFigureOut">
               <a:rPr lang="de-DE" smtClean="0"/>
-              <a:t>13.12.2022</a:t>
+              <a:t>02.05.2023</a:t>
             </a:fld>
             <a:endParaRPr lang="de-DE"/>
           </a:p>
@@ -2409,7 +2409,7 @@
           <a:p>
             <a:fld id="{49B5A622-7BB8-4C10-9D44-AD00F8B365F2}" type="datetimeFigureOut">
               <a:rPr lang="de-DE" smtClean="0"/>
-              <a:t>13.12.2022</a:t>
+              <a:t>02.05.2023</a:t>
             </a:fld>
             <a:endParaRPr lang="de-DE"/>
           </a:p>
@@ -2698,7 +2698,7 @@
           <a:p>
             <a:fld id="{49B5A622-7BB8-4C10-9D44-AD00F8B365F2}" type="datetimeFigureOut">
               <a:rPr lang="de-DE" smtClean="0"/>
-              <a:t>13.12.2022</a:t>
+              <a:t>02.05.2023</a:t>
             </a:fld>
             <a:endParaRPr lang="de-DE"/>
           </a:p>
@@ -2941,7 +2941,7 @@
           <a:p>
             <a:fld id="{49B5A622-7BB8-4C10-9D44-AD00F8B365F2}" type="datetimeFigureOut">
               <a:rPr lang="de-DE" smtClean="0"/>
-              <a:t>13.12.2022</a:t>
+              <a:t>02.05.2023</a:t>
             </a:fld>
             <a:endParaRPr lang="de-DE"/>
           </a:p>
@@ -3518,6 +3518,104 @@
           </a:effectLst>
         </p:spPr>
       </p:pic>
+      <p:sp>
+        <p:nvSpPr>
+          <p:cNvPr id="2" name="Rectangle 1">
+            <a:extLst>
+              <a:ext uri="{FF2B5EF4-FFF2-40B4-BE49-F238E27FC236}">
+                <a16:creationId xmlns:a16="http://schemas.microsoft.com/office/drawing/2014/main" id="{B6AE012D-1D1A-603C-D310-5B4F7DF3654E}"/>
+              </a:ext>
+            </a:extLst>
+          </p:cNvPr>
+          <p:cNvSpPr/>
+          <p:nvPr/>
+        </p:nvSpPr>
+        <p:spPr>
+          <a:xfrm>
+            <a:off x="4316506" y="4363569"/>
+            <a:ext cx="1967191" cy="298978"/>
+          </a:xfrm>
+          <a:prstGeom prst="rect">
+            <a:avLst/>
+          </a:prstGeom>
+          <a:effectLst>
+            <a:softEdge rad="63500"/>
+          </a:effectLst>
+        </p:spPr>
+        <p:style>
+          <a:lnRef idx="2">
+            <a:schemeClr val="accent3">
+              <a:shade val="50000"/>
+            </a:schemeClr>
+          </a:lnRef>
+          <a:fillRef idx="1">
+            <a:schemeClr val="accent3"/>
+          </a:fillRef>
+          <a:effectRef idx="0">
+            <a:schemeClr val="accent3"/>
+          </a:effectRef>
+          <a:fontRef idx="minor">
+            <a:schemeClr val="lt1"/>
+          </a:fontRef>
+        </p:style>
+        <p:txBody>
+          <a:bodyPr rtlCol="0" anchor="ctr"/>
+          <a:lstStyle/>
+          <a:p>
+            <a:pPr algn="ctr"/>
+            <a:endParaRPr lang="de-DE"/>
+          </a:p>
+        </p:txBody>
+      </p:sp>
+      <p:sp>
+        <p:nvSpPr>
+          <p:cNvPr id="6" name="Rectangle 5">
+            <a:extLst>
+              <a:ext uri="{FF2B5EF4-FFF2-40B4-BE49-F238E27FC236}">
+                <a16:creationId xmlns:a16="http://schemas.microsoft.com/office/drawing/2014/main" id="{CF92321B-4544-2EEA-00A2-91F3F9860C17}"/>
+              </a:ext>
+            </a:extLst>
+          </p:cNvPr>
+          <p:cNvSpPr/>
+          <p:nvPr/>
+        </p:nvSpPr>
+        <p:spPr>
+          <a:xfrm>
+            <a:off x="3946674" y="3870510"/>
+            <a:ext cx="1143037" cy="298978"/>
+          </a:xfrm>
+          <a:prstGeom prst="rect">
+            <a:avLst/>
+          </a:prstGeom>
+          <a:effectLst>
+            <a:softEdge rad="63500"/>
+          </a:effectLst>
+        </p:spPr>
+        <p:style>
+          <a:lnRef idx="2">
+            <a:schemeClr val="accent3">
+              <a:shade val="50000"/>
+            </a:schemeClr>
+          </a:lnRef>
+          <a:fillRef idx="1">
+            <a:schemeClr val="accent3"/>
+          </a:fillRef>
+          <a:effectRef idx="0">
+            <a:schemeClr val="accent3"/>
+          </a:effectRef>
+          <a:fontRef idx="minor">
+            <a:schemeClr val="lt1"/>
+          </a:fontRef>
+        </p:style>
+        <p:txBody>
+          <a:bodyPr rtlCol="0" anchor="ctr"/>
+          <a:lstStyle/>
+          <a:p>
+            <a:pPr algn="ctr"/>
+            <a:endParaRPr lang="de-DE"/>
+          </a:p>
+        </p:txBody>
+      </p:sp>
     </p:spTree>
     <p:extLst>
       <p:ext uri="{BB962C8B-B14F-4D97-AF65-F5344CB8AC3E}">

</xml_diff>